<commit_message>
Completed revisions to project and presentation
</commit_message>
<xml_diff>
--- a/Module2-Final-Project.pptx
+++ b/Module2-Final-Project.pptx
@@ -5,7 +5,7 @@
     <p:sldMasterId id="2147483660" r:id="rId1"/>
   </p:sldMasterIdLst>
   <p:notesMasterIdLst>
-    <p:notesMasterId r:id="rId8"/>
+    <p:notesMasterId r:id="rId9"/>
   </p:notesMasterIdLst>
   <p:sldIdLst>
     <p:sldId id="256" r:id="rId2"/>
@@ -13,7 +13,8 @@
     <p:sldId id="258" r:id="rId4"/>
     <p:sldId id="259" r:id="rId5"/>
     <p:sldId id="260" r:id="rId6"/>
-    <p:sldId id="261" r:id="rId7"/>
+    <p:sldId id="262" r:id="rId7"/>
+    <p:sldId id="261" r:id="rId8"/>
   </p:sldIdLst>
   <p:sldSz cx="9144000" cy="6858000" type="screen4x3"/>
   <p:notesSz cx="6858000" cy="9144000"/>
@@ -197,7 +198,7 @@
           <a:p>
             <a:fld id="{20F43B90-25FA-436D-B498-8BA086AF175A}" type="datetimeFigureOut">
               <a:rPr lang="en-US" smtClean="0"/>
-              <a:t>12/13/2019</a:t>
+              <a:t>3/1/2020</a:t>
             </a:fld>
             <a:endParaRPr lang="en-US"/>
           </a:p>
@@ -463,6 +464,90 @@
     </a:lvl9pPr>
   </p:notesStyle>
 </p:notesMaster>
+</file>
+
+<file path=ppt/notesSlides/notesSlide1.xml><?xml version="1.0" encoding="utf-8"?>
+<p:notes xmlns:a="http://schemas.openxmlformats.org/drawingml/2006/main" xmlns:r="http://schemas.openxmlformats.org/officeDocument/2006/relationships" xmlns:p="http://schemas.openxmlformats.org/presentationml/2006/main">
+  <p:cSld>
+    <p:spTree>
+      <p:nvGrpSpPr>
+        <p:cNvPr id="1" name=""/>
+        <p:cNvGrpSpPr/>
+        <p:nvPr/>
+      </p:nvGrpSpPr>
+      <p:grpSpPr>
+        <a:xfrm>
+          <a:off x="0" y="0"/>
+          <a:ext cx="0" cy="0"/>
+          <a:chOff x="0" y="0"/>
+          <a:chExt cx="0" cy="0"/>
+        </a:xfrm>
+      </p:grpSpPr>
+      <p:sp>
+        <p:nvSpPr>
+          <p:cNvPr id="2" name="Slide Image Placeholder 1"/>
+          <p:cNvSpPr>
+            <a:spLocks noGrp="1" noRot="1" noChangeAspect="1"/>
+          </p:cNvSpPr>
+          <p:nvPr>
+            <p:ph type="sldImg"/>
+          </p:nvPr>
+        </p:nvSpPr>
+        <p:spPr/>
+      </p:sp>
+      <p:sp>
+        <p:nvSpPr>
+          <p:cNvPr id="3" name="Notes Placeholder 2"/>
+          <p:cNvSpPr>
+            <a:spLocks noGrp="1"/>
+          </p:cNvSpPr>
+          <p:nvPr>
+            <p:ph type="body" idx="1"/>
+          </p:nvPr>
+        </p:nvSpPr>
+        <p:spPr/>
+        <p:txBody>
+          <a:bodyPr/>
+          <a:lstStyle/>
+          <a:p>
+            <a:endParaRPr lang="en-US" dirty="0"/>
+          </a:p>
+        </p:txBody>
+      </p:sp>
+      <p:sp>
+        <p:nvSpPr>
+          <p:cNvPr id="4" name="Slide Number Placeholder 3"/>
+          <p:cNvSpPr>
+            <a:spLocks noGrp="1"/>
+          </p:cNvSpPr>
+          <p:nvPr>
+            <p:ph type="sldNum" sz="quarter" idx="10"/>
+          </p:nvPr>
+        </p:nvSpPr>
+        <p:spPr/>
+        <p:txBody>
+          <a:bodyPr/>
+          <a:lstStyle/>
+          <a:p>
+            <a:fld id="{D8A86B54-5002-4B7B-A14D-4DBA8313D464}" type="slidenum">
+              <a:rPr lang="en-US" smtClean="0"/>
+              <a:t>6</a:t>
+            </a:fld>
+            <a:endParaRPr lang="en-US"/>
+          </a:p>
+        </p:txBody>
+      </p:sp>
+    </p:spTree>
+    <p:extLst>
+      <p:ext uri="{BB962C8B-B14F-4D97-AF65-F5344CB8AC3E}">
+        <p14:creationId xmlns:p14="http://schemas.microsoft.com/office/powerpoint/2010/main" val="969519347"/>
+      </p:ext>
+    </p:extLst>
+  </p:cSld>
+  <p:clrMapOvr>
+    <a:masterClrMapping/>
+  </p:clrMapOvr>
+</p:notes>
 </file>
 
 <file path=ppt/slideLayouts/slideLayout1.xml><?xml version="1.0" encoding="utf-8"?>
@@ -3873,11 +3958,19 @@
           <a:p>
             <a:r>
               <a:rPr lang="en-US" dirty="0" smtClean="0"/>
-              <a:t>October/December </a:t>
+              <a:t>March 2</a:t>
+            </a:r>
+            <a:r>
+              <a:rPr lang="en-US" baseline="30000" dirty="0" smtClean="0"/>
+              <a:t>nd</a:t>
             </a:r>
             <a:r>
               <a:rPr lang="en-US" dirty="0" smtClean="0"/>
-              <a:t>2019</a:t>
+              <a:t>, </a:t>
+            </a:r>
+            <a:r>
+              <a:rPr lang="en-US" dirty="0" smtClean="0"/>
+              <a:t>2020</a:t>
             </a:r>
             <a:endParaRPr lang="en-US" dirty="0"/>
           </a:p>
@@ -4397,12 +4490,14 @@
             <a:spLocks noGrp="1"/>
           </p:cNvSpPr>
           <p:nvPr>
-            <p:ph idx="1"/>
-          </p:nvPr>
-        </p:nvSpPr>
-        <p:spPr/>
-        <p:txBody>
-          <a:bodyPr/>
+            <p:ph sz="half" idx="1"/>
+          </p:nvPr>
+        </p:nvSpPr>
+        <p:spPr/>
+        <p:txBody>
+          <a:bodyPr>
+            <a:normAutofit fontScale="92500" lnSpcReduction="20000"/>
+          </a:bodyPr>
           <a:lstStyle/>
           <a:p>
             <a:r>
@@ -4413,19 +4508,15 @@
           <a:p>
             <a:r>
               <a:rPr lang="en-US" dirty="0" smtClean="0"/>
-              <a:t>United Package (in the database as #2) and Federal Shipping (as #3)</a:t>
+              <a:t>United Package (in the database as #2) and Federal Shipping (as #</a:t>
             </a:r>
             <a:r>
               <a:rPr lang="en-US" dirty="0" smtClean="0"/>
-              <a:t> </a:t>
+              <a:t>3) </a:t>
             </a:r>
             <a:r>
               <a:rPr lang="en-US" dirty="0" smtClean="0"/>
-              <a:t>are especially </a:t>
-            </a:r>
-            <a:r>
-              <a:rPr lang="en-US" dirty="0" smtClean="0"/>
-              <a:t>similar.</a:t>
+              <a:t>are especially similar.</a:t>
             </a:r>
           </a:p>
           <a:p>
@@ -4433,7 +4524,81 @@
               <a:rPr lang="en-US" dirty="0" smtClean="0"/>
               <a:t>The highest shipping costs are found with United Package and Federal Shipping, so look into Speedy Express (#1)’s rates at the upper end.</a:t>
             </a:r>
-            <a:endParaRPr lang="en-US" dirty="0" smtClean="0"/>
+          </a:p>
+        </p:txBody>
+      </p:sp>
+      <p:pic>
+        <p:nvPicPr>
+          <p:cNvPr id="8" name="Content Placeholder 7"/>
+          <p:cNvPicPr>
+            <a:picLocks noGrp="1" noChangeAspect="1"/>
+          </p:cNvPicPr>
+          <p:nvPr>
+            <p:ph sz="half" idx="2"/>
+          </p:nvPr>
+        </p:nvPicPr>
+        <p:blipFill>
+          <a:blip r:embed="rId2">
+            <a:extLst>
+              <a:ext uri="{28A0092B-C50C-407E-A947-70E740481C1C}">
+                <a14:useLocalDpi xmlns:a14="http://schemas.microsoft.com/office/drawing/2010/main" val="0"/>
+              </a:ext>
+            </a:extLst>
+          </a:blip>
+          <a:stretch>
+            <a:fillRect/>
+          </a:stretch>
+        </p:blipFill>
+        <p:spPr>
+          <a:xfrm>
+            <a:off x="4343400" y="2362200"/>
+            <a:ext cx="4638675" cy="3092449"/>
+          </a:xfrm>
+        </p:spPr>
+      </p:pic>
+      <p:sp>
+        <p:nvSpPr>
+          <p:cNvPr id="6" name="Date Placeholder 5"/>
+          <p:cNvSpPr>
+            <a:spLocks noGrp="1"/>
+          </p:cNvSpPr>
+          <p:nvPr>
+            <p:ph type="dt" sz="half" idx="10"/>
+          </p:nvPr>
+        </p:nvSpPr>
+        <p:spPr/>
+        <p:txBody>
+          <a:bodyPr/>
+          <a:lstStyle/>
+          <a:p>
+            <a:r>
+              <a:rPr lang="en-US" smtClean="0"/>
+              <a:t>Module 2/3 Final Project</a:t>
+            </a:r>
+            <a:endParaRPr lang="en-US"/>
+          </a:p>
+        </p:txBody>
+      </p:sp>
+      <p:sp>
+        <p:nvSpPr>
+          <p:cNvPr id="5" name="Footer Placeholder 4"/>
+          <p:cNvSpPr>
+            <a:spLocks noGrp="1"/>
+          </p:cNvSpPr>
+          <p:nvPr>
+            <p:ph type="ftr" sz="quarter" idx="11"/>
+          </p:nvPr>
+        </p:nvSpPr>
+        <p:spPr/>
+        <p:txBody>
+          <a:bodyPr/>
+          <a:lstStyle/>
+          <a:p>
+            <a:r>
+              <a:rPr lang="en-US" smtClean="0"/>
+              <a:t>Cohn-Cort</a:t>
+            </a:r>
+            <a:endParaRPr lang="en-US"/>
           </a:p>
         </p:txBody>
       </p:sp>
@@ -4457,52 +4622,6 @@
               <a:pPr/>
               <a:t>4</a:t>
             </a:fld>
-            <a:endParaRPr lang="en-US"/>
-          </a:p>
-        </p:txBody>
-      </p:sp>
-      <p:sp>
-        <p:nvSpPr>
-          <p:cNvPr id="5" name="Footer Placeholder 4"/>
-          <p:cNvSpPr>
-            <a:spLocks noGrp="1"/>
-          </p:cNvSpPr>
-          <p:nvPr>
-            <p:ph type="ftr" sz="quarter" idx="11"/>
-          </p:nvPr>
-        </p:nvSpPr>
-        <p:spPr/>
-        <p:txBody>
-          <a:bodyPr/>
-          <a:lstStyle/>
-          <a:p>
-            <a:r>
-              <a:rPr lang="en-US" smtClean="0"/>
-              <a:t>Cohn-Cort</a:t>
-            </a:r>
-            <a:endParaRPr lang="en-US"/>
-          </a:p>
-        </p:txBody>
-      </p:sp>
-      <p:sp>
-        <p:nvSpPr>
-          <p:cNvPr id="6" name="Date Placeholder 5"/>
-          <p:cNvSpPr>
-            <a:spLocks noGrp="1"/>
-          </p:cNvSpPr>
-          <p:nvPr>
-            <p:ph type="dt" sz="half" idx="10"/>
-          </p:nvPr>
-        </p:nvSpPr>
-        <p:spPr/>
-        <p:txBody>
-          <a:bodyPr/>
-          <a:lstStyle/>
-          <a:p>
-            <a:r>
-              <a:rPr lang="en-US" smtClean="0"/>
-              <a:t>Module 2/3 Final Project</a:t>
-            </a:r>
             <a:endParaRPr lang="en-US"/>
           </a:p>
         </p:txBody>
@@ -4573,53 +4692,6 @@
       </p:sp>
       <p:sp>
         <p:nvSpPr>
-          <p:cNvPr id="3" name="Content Placeholder 2"/>
-          <p:cNvSpPr>
-            <a:spLocks noGrp="1"/>
-          </p:cNvSpPr>
-          <p:nvPr>
-            <p:ph idx="1"/>
-          </p:nvPr>
-        </p:nvSpPr>
-        <p:spPr/>
-        <p:txBody>
-          <a:bodyPr/>
-          <a:lstStyle/>
-          <a:p>
-            <a:r>
-              <a:rPr lang="en-US" dirty="0" smtClean="0"/>
-              <a:t>The total price of orders that contain items that are out of stock or have been discontinued</a:t>
-            </a:r>
-            <a:r>
-              <a:rPr lang="en-US" dirty="0" smtClean="0"/>
-              <a:t>.</a:t>
-            </a:r>
-          </a:p>
-          <a:p>
-            <a:r>
-              <a:rPr lang="en-US" dirty="0" smtClean="0"/>
-              <a:t>Ultimately, the total amount</a:t>
-            </a:r>
-            <a:r>
-              <a:rPr lang="en-US" baseline="0" dirty="0" smtClean="0"/>
-              <a:t> paid for an order is barely affected by whether an item is out of stock or discontinued.</a:t>
-            </a:r>
-          </a:p>
-          <a:p>
-            <a:r>
-              <a:rPr lang="en-US" dirty="0" smtClean="0"/>
-              <a:t>Combined with the earlier information on discount offers, this may mean</a:t>
-            </a:r>
-            <a:r>
-              <a:rPr lang="en-US" baseline="0" dirty="0" smtClean="0"/>
-              <a:t> that there is no reason to sell out-of-stock or discontinued products at any significant discount.</a:t>
-            </a:r>
-            <a:endParaRPr lang="en-US" dirty="0"/>
-          </a:p>
-        </p:txBody>
-      </p:sp>
-      <p:sp>
-        <p:nvSpPr>
           <p:cNvPr id="4" name="Slide Number Placeholder 3"/>
           <p:cNvSpPr>
             <a:spLocks noGrp="1"/>
@@ -4685,6 +4757,78 @@
               <a:t>Module 2/3 Final Project</a:t>
             </a:r>
             <a:endParaRPr lang="en-US"/>
+          </a:p>
+        </p:txBody>
+      </p:sp>
+      <p:pic>
+        <p:nvPicPr>
+          <p:cNvPr id="7" name="Picture 6"/>
+          <p:cNvPicPr>
+            <a:picLocks noChangeAspect="1"/>
+          </p:cNvPicPr>
+          <p:nvPr/>
+        </p:nvPicPr>
+        <p:blipFill>
+          <a:blip r:embed="rId2">
+            <a:extLst>
+              <a:ext uri="{28A0092B-C50C-407E-A947-70E740481C1C}">
+                <a14:useLocalDpi xmlns:a14="http://schemas.microsoft.com/office/drawing/2010/main" val="0"/>
+              </a:ext>
+            </a:extLst>
+          </a:blip>
+          <a:stretch>
+            <a:fillRect/>
+          </a:stretch>
+        </p:blipFill>
+        <p:spPr>
+          <a:xfrm>
+            <a:off x="1828175" y="3199567"/>
+            <a:ext cx="5487650" cy="3658433"/>
+          </a:xfrm>
+          <a:prstGeom prst="rect">
+            <a:avLst/>
+          </a:prstGeom>
+        </p:spPr>
+      </p:pic>
+      <p:sp>
+        <p:nvSpPr>
+          <p:cNvPr id="3" name="Content Placeholder 2"/>
+          <p:cNvSpPr>
+            <a:spLocks noGrp="1"/>
+          </p:cNvSpPr>
+          <p:nvPr>
+            <p:ph idx="1"/>
+          </p:nvPr>
+        </p:nvSpPr>
+        <p:spPr>
+          <a:xfrm>
+            <a:off x="457200" y="1600200"/>
+            <a:ext cx="8229600" cy="2209800"/>
+          </a:xfrm>
+        </p:spPr>
+        <p:txBody>
+          <a:bodyPr/>
+          <a:lstStyle/>
+          <a:p>
+            <a:r>
+              <a:rPr lang="en-US" dirty="0" smtClean="0"/>
+              <a:t>The total price of orders that contain items that are out of stock or have been discontinued.</a:t>
+            </a:r>
+          </a:p>
+          <a:p>
+            <a:r>
+              <a:rPr lang="en-US" dirty="0" smtClean="0"/>
+              <a:t>Ultimately, the total amount</a:t>
+            </a:r>
+            <a:r>
+              <a:rPr lang="en-US" baseline="0" dirty="0" smtClean="0"/>
+              <a:t> paid for an order is barely affected by whether an item is out of stock or discontinued</a:t>
+            </a:r>
+            <a:r>
+              <a:rPr lang="en-US" baseline="0" dirty="0" smtClean="0"/>
+              <a:t>.</a:t>
+            </a:r>
+            <a:endParaRPr lang="en-US" baseline="0" dirty="0" smtClean="0"/>
           </a:p>
         </p:txBody>
       </p:sp>
@@ -4727,6 +4871,221 @@
       </p:grpSpPr>
       <p:sp>
         <p:nvSpPr>
+          <p:cNvPr id="2" name="Title 1"/>
+          <p:cNvSpPr>
+            <a:spLocks noGrp="1"/>
+          </p:cNvSpPr>
+          <p:nvPr>
+            <p:ph type="title"/>
+          </p:nvPr>
+        </p:nvSpPr>
+        <p:spPr/>
+        <p:txBody>
+          <a:bodyPr/>
+          <a:lstStyle/>
+          <a:p>
+            <a:r>
+              <a:rPr lang="en-US" dirty="0" smtClean="0"/>
+              <a:t>Conclusions</a:t>
+            </a:r>
+            <a:endParaRPr lang="en-US" dirty="0"/>
+          </a:p>
+        </p:txBody>
+      </p:sp>
+      <p:sp>
+        <p:nvSpPr>
+          <p:cNvPr id="3" name="Content Placeholder 2"/>
+          <p:cNvSpPr>
+            <a:spLocks noGrp="1"/>
+          </p:cNvSpPr>
+          <p:nvPr>
+            <p:ph idx="1"/>
+          </p:nvPr>
+        </p:nvSpPr>
+        <p:spPr/>
+        <p:txBody>
+          <a:bodyPr/>
+          <a:lstStyle/>
+          <a:p>
+            <a:pPr marL="457200" indent="-457200">
+              <a:buFont typeface="+mj-lt"/>
+              <a:buAutoNum type="arabicPeriod"/>
+            </a:pPr>
+            <a:r>
+              <a:rPr lang="en-US" dirty="0" smtClean="0"/>
+              <a:t>If an item is discounted, </a:t>
+            </a:r>
+            <a:r>
+              <a:rPr lang="en-US" dirty="0" err="1" smtClean="0"/>
+              <a:t>Northwind</a:t>
+            </a:r>
+            <a:r>
+              <a:rPr lang="en-US" baseline="0" dirty="0" smtClean="0"/>
+              <a:t> sells more of it</a:t>
+            </a:r>
+            <a:endParaRPr lang="en-US" dirty="0" smtClean="0"/>
+          </a:p>
+          <a:p>
+            <a:pPr marL="457200" indent="-457200">
+              <a:buFont typeface="+mj-lt"/>
+              <a:buAutoNum type="arabicPeriod"/>
+            </a:pPr>
+            <a:r>
+              <a:rPr lang="en-US" dirty="0" smtClean="0"/>
+              <a:t>No</a:t>
+            </a:r>
+            <a:r>
+              <a:rPr lang="en-US" baseline="0" dirty="0" smtClean="0"/>
+              <a:t> significant difference in freight charges during winter; no extra charge for cold weather</a:t>
+            </a:r>
+            <a:endParaRPr lang="en-US" dirty="0" smtClean="0"/>
+          </a:p>
+          <a:p>
+            <a:pPr marL="457200" indent="-457200">
+              <a:buFont typeface="+mj-lt"/>
+              <a:buAutoNum type="arabicPeriod"/>
+            </a:pPr>
+            <a:r>
+              <a:rPr lang="en-US" dirty="0" smtClean="0"/>
+              <a:t>Speedy</a:t>
+            </a:r>
+            <a:r>
+              <a:rPr lang="en-US" baseline="0" dirty="0" smtClean="0"/>
+              <a:t> Express does not currently ship products at the upper end of freight charges, so should look into whether their rates may be cheaper than United Package or Federal Shipping for that range</a:t>
+            </a:r>
+            <a:endParaRPr lang="en-US" dirty="0" smtClean="0"/>
+          </a:p>
+          <a:p>
+            <a:pPr marL="457200" indent="-457200">
+              <a:buFont typeface="+mj-lt"/>
+              <a:buAutoNum type="arabicPeriod"/>
+            </a:pPr>
+            <a:r>
+              <a:rPr lang="en-US" dirty="0" smtClean="0"/>
+              <a:t>Further</a:t>
+            </a:r>
+            <a:r>
+              <a:rPr lang="en-US" baseline="0" dirty="0" smtClean="0"/>
+              <a:t> research into whether we sell discontinued or out-of-stock products at a discount may show that we don’t need to</a:t>
+            </a:r>
+            <a:r>
+              <a:rPr lang="en-US" dirty="0" smtClean="0"/>
+              <a:t> </a:t>
+            </a:r>
+            <a:r>
+              <a:rPr lang="en-US" baseline="0" dirty="0" smtClean="0"/>
+              <a:t>discount them</a:t>
+            </a:r>
+            <a:r>
+              <a:rPr lang="en-US" dirty="0" smtClean="0"/>
+              <a:t> that much</a:t>
+            </a:r>
+            <a:endParaRPr lang="en-US" dirty="0"/>
+          </a:p>
+        </p:txBody>
+      </p:sp>
+      <p:sp>
+        <p:nvSpPr>
+          <p:cNvPr id="4" name="Date Placeholder 3"/>
+          <p:cNvSpPr>
+            <a:spLocks noGrp="1"/>
+          </p:cNvSpPr>
+          <p:nvPr>
+            <p:ph type="dt" sz="half" idx="10"/>
+          </p:nvPr>
+        </p:nvSpPr>
+        <p:spPr/>
+        <p:txBody>
+          <a:bodyPr/>
+          <a:lstStyle/>
+          <a:p>
+            <a:r>
+              <a:rPr lang="en-US" smtClean="0"/>
+              <a:t>Module 2/3 Final Project</a:t>
+            </a:r>
+            <a:endParaRPr lang="en-US"/>
+          </a:p>
+        </p:txBody>
+      </p:sp>
+      <p:sp>
+        <p:nvSpPr>
+          <p:cNvPr id="5" name="Footer Placeholder 4"/>
+          <p:cNvSpPr>
+            <a:spLocks noGrp="1"/>
+          </p:cNvSpPr>
+          <p:nvPr>
+            <p:ph type="ftr" sz="quarter" idx="11"/>
+          </p:nvPr>
+        </p:nvSpPr>
+        <p:spPr/>
+        <p:txBody>
+          <a:bodyPr/>
+          <a:lstStyle/>
+          <a:p>
+            <a:r>
+              <a:rPr lang="en-US" smtClean="0"/>
+              <a:t>Cohn-Cort</a:t>
+            </a:r>
+            <a:endParaRPr lang="en-US"/>
+          </a:p>
+        </p:txBody>
+      </p:sp>
+      <p:sp>
+        <p:nvSpPr>
+          <p:cNvPr id="6" name="Slide Number Placeholder 5"/>
+          <p:cNvSpPr>
+            <a:spLocks noGrp="1"/>
+          </p:cNvSpPr>
+          <p:nvPr>
+            <p:ph type="sldNum" sz="quarter" idx="12"/>
+          </p:nvPr>
+        </p:nvSpPr>
+        <p:spPr/>
+        <p:txBody>
+          <a:bodyPr/>
+          <a:lstStyle/>
+          <a:p>
+            <a:fld id="{B6F15528-21DE-4FAA-801E-634DDDAF4B2B}" type="slidenum">
+              <a:rPr lang="en-US" smtClean="0"/>
+              <a:pPr/>
+              <a:t>6</a:t>
+            </a:fld>
+            <a:endParaRPr lang="en-US"/>
+          </a:p>
+        </p:txBody>
+      </p:sp>
+    </p:spTree>
+    <p:extLst>
+      <p:ext uri="{BB962C8B-B14F-4D97-AF65-F5344CB8AC3E}">
+        <p14:creationId xmlns:p14="http://schemas.microsoft.com/office/powerpoint/2010/main" val="756729995"/>
+      </p:ext>
+    </p:extLst>
+  </p:cSld>
+  <p:clrMapOvr>
+    <a:masterClrMapping/>
+  </p:clrMapOvr>
+</p:sld>
+</file>
+
+<file path=ppt/slides/slide7.xml><?xml version="1.0" encoding="utf-8"?>
+<p:sld xmlns:a="http://schemas.openxmlformats.org/drawingml/2006/main" xmlns:r="http://schemas.openxmlformats.org/officeDocument/2006/relationships" xmlns:p="http://schemas.openxmlformats.org/presentationml/2006/main">
+  <p:cSld>
+    <p:spTree>
+      <p:nvGrpSpPr>
+        <p:cNvPr id="1" name=""/>
+        <p:cNvGrpSpPr/>
+        <p:nvPr/>
+      </p:nvGrpSpPr>
+      <p:grpSpPr>
+        <a:xfrm>
+          <a:off x="0" y="0"/>
+          <a:ext cx="0" cy="0"/>
+          <a:chOff x="0" y="0"/>
+          <a:chExt cx="0" cy="0"/>
+        </a:xfrm>
+      </p:grpSpPr>
+      <p:sp>
+        <p:nvSpPr>
           <p:cNvPr id="4" name="Title 3"/>
           <p:cNvSpPr>
             <a:spLocks noGrp="1"/>
@@ -4859,15 +5218,11 @@
             </a:r>
             <a:r>
               <a:rPr lang="en-US" baseline="0" dirty="0" smtClean="0"/>
-              <a:t> </a:t>
+              <a:t> Lead </a:t>
             </a:r>
             <a:r>
               <a:rPr lang="en-US" baseline="0" dirty="0" smtClean="0"/>
-              <a:t>Lead Instructor </a:t>
-            </a:r>
-            <a:r>
-              <a:rPr lang="en-US" baseline="0" dirty="0" smtClean="0"/>
-              <a:t>Eli.</a:t>
+              <a:t>Instructors Eli &amp; Jeff.</a:t>
             </a:r>
             <a:endParaRPr lang="en-US" dirty="0"/>
           </a:p>
@@ -4891,7 +5246,7 @@
             <a:fld id="{B6F15528-21DE-4FAA-801E-634DDDAF4B2B}" type="slidenum">
               <a:rPr lang="en-US" smtClean="0"/>
               <a:pPr/>
-              <a:t>6</a:t>
+              <a:t>7</a:t>
             </a:fld>
             <a:endParaRPr lang="en-US"/>
           </a:p>

</xml_diff>